<commit_message>
Added new post & edited some things
</commit_message>
<xml_diff>
--- a/assets/img/logo.pptx
+++ b/assets/img/logo.pptx
@@ -104,6 +104,11 @@
       </a:defRPr>
     </a:lvl9pPr>
   </p:defaultTextStyle>
+  <p:extLst>
+    <p:ext uri="{EFAFB233-063F-42B5-8137-9DF3F51BA10A}">
+      <p15:sldGuideLst xmlns:p15="http://schemas.microsoft.com/office/powerpoint/2012/main"/>
+    </p:ext>
+  </p:extLst>
 </p:presentation>
 </file>
 
@@ -3000,9 +3005,9 @@
                 <a:effectLst>
                   <a:glow rad="63500">
                     <a:schemeClr val="tx1">
-                      <a:lumMod val="85000"/>
-                      <a:lumOff val="15000"/>
-                      <a:alpha val="50000"/>
+                      <a:lumMod val="95000"/>
+                      <a:lumOff val="5000"/>
+                      <a:alpha val="60000"/>
                     </a:schemeClr>
                   </a:glow>
                 </a:effectLst>
@@ -3017,9 +3022,9 @@
               <a:effectLst>
                 <a:glow rad="63500">
                   <a:schemeClr val="tx1">
-                    <a:lumMod val="85000"/>
-                    <a:lumOff val="15000"/>
-                    <a:alpha val="50000"/>
+                    <a:lumMod val="95000"/>
+                    <a:lumOff val="5000"/>
+                    <a:alpha val="60000"/>
                   </a:schemeClr>
                 </a:glow>
               </a:effectLst>
@@ -3059,9 +3064,9 @@
                 <a:effectLst>
                   <a:glow rad="63500">
                     <a:schemeClr val="tx1">
-                      <a:lumMod val="85000"/>
-                      <a:lumOff val="15000"/>
-                      <a:alpha val="50000"/>
+                      <a:lumMod val="95000"/>
+                      <a:lumOff val="5000"/>
+                      <a:alpha val="60000"/>
                     </a:schemeClr>
                   </a:glow>
                 </a:effectLst>
@@ -3076,9 +3081,9 @@
               <a:effectLst>
                 <a:glow rad="63500">
                   <a:schemeClr val="tx1">
-                    <a:lumMod val="85000"/>
-                    <a:lumOff val="15000"/>
-                    <a:alpha val="50000"/>
+                    <a:lumMod val="95000"/>
+                    <a:lumOff val="5000"/>
+                    <a:alpha val="60000"/>
                   </a:schemeClr>
                 </a:glow>
               </a:effectLst>

</xml_diff>